<commit_message>
fixed links and some typos
</commit_message>
<xml_diff>
--- a/Artefakte/WS2324_HausenHeSancak_Audit2.pptx
+++ b/Artefakte/WS2324_HausenHeSancak_Audit2.pptx
@@ -29,19 +29,19 @@
   <p:notesSz cx="6858000" cy="9144000"/>
   <p:embeddedFontLst>
     <p:embeddedFont>
-      <p:font typeface="Gill Sans" panose="020B0604020202020204" charset="0"/>
+      <p:font typeface="Gill Sans" panose="020B0600070205080204" charset="0"/>
       <p:regular r:id="rId22"/>
       <p:bold r:id="rId23"/>
     </p:embeddedFont>
     <p:embeddedFont>
-      <p:font typeface="Helvetica Neue" panose="020B0604020202020204" charset="0"/>
+      <p:font typeface="Helvetica Neue" panose="020B0600070205080204" charset="0"/>
       <p:regular r:id="rId24"/>
       <p:bold r:id="rId25"/>
       <p:italic r:id="rId26"/>
       <p:boldItalic r:id="rId27"/>
     </p:embeddedFont>
     <p:embeddedFont>
-      <p:font typeface="Helvetica Neue Light" panose="020B0604020202020204" charset="0"/>
+      <p:font typeface="Helvetica Neue Light" panose="020B0600070205080204" charset="0"/>
       <p:regular r:id="rId28"/>
       <p:bold r:id="rId29"/>
       <p:italic r:id="rId30"/>
@@ -304,7 +304,7 @@
       <p15:notesGuideLst xmlns:p15="http://schemas.microsoft.com/office/powerpoint/2012/main"/>
     </p:ext>
     <p:ext uri="http://customooxmlschemas.google.com/">
-      <go:slidesCustomData xmlns="" xmlns:go="http://customooxmlschemas.google.com/" xmlns:ahyp="http://schemas.microsoft.com/office/drawing/2018/hyperlinkcolor" xmlns:p15="http://schemas.microsoft.com/office/powerpoint/2012/main" xmlns:p14="http://schemas.microsoft.com/office/powerpoint/2010/main" xmlns:com="http://schemas.openxmlformats.org/drawingml/2006/compatibility" xmlns:pvml="urn:schemas-microsoft-com:office:powerpoint" xmlns:v="urn:schemas-microsoft-com:vml" xmlns:o="urn:schemas-microsoft-com:office:office" xmlns:dgm="http://schemas.openxmlformats.org/drawingml/2006/diagram" xmlns:c="http://schemas.openxmlformats.org/drawingml/2006/chart" xmlns:mv="urn:schemas-microsoft-com:mac:vml" xmlns:mc="http://schemas.openxmlformats.org/markup-compatibility/2006" r:id="rId47" roundtripDataSignature="AMtx7mimICv9YlzhO8JUkVatL8Va69Fidw=="/>
+      <go:slidesCustomData xmlns:mc="http://schemas.openxmlformats.org/markup-compatibility/2006" xmlns:mv="urn:schemas-microsoft-com:mac:vml" xmlns:c="http://schemas.openxmlformats.org/drawingml/2006/chart" xmlns:dgm="http://schemas.openxmlformats.org/drawingml/2006/diagram" xmlns:o="urn:schemas-microsoft-com:office:office" xmlns:v="urn:schemas-microsoft-com:vml" xmlns:pvml="urn:schemas-microsoft-com:office:powerpoint" xmlns:com="http://schemas.openxmlformats.org/drawingml/2006/compatibility" xmlns:p14="http://schemas.microsoft.com/office/powerpoint/2010/main" xmlns:p15="http://schemas.microsoft.com/office/powerpoint/2012/main" xmlns:ahyp="http://schemas.microsoft.com/office/drawing/2018/hyperlinkcolor" xmlns:go="http://customooxmlschemas.google.com/" xmlns="" r:id="rId47" roundtripDataSignature="AMtx7mimICv9YlzhO8JUkVatL8Va69Fidw=="/>
     </p:ext>
   </p:extLst>
 </p:presentation>
@@ -1087,7 +1087,7 @@
             <a:pPr marL="0" indent="0"/>
             <a:r>
               <a:rPr lang="de-DE" sz="1400" dirty="0"/>
-              <a:t>Der Algorithmus für Empfehlungen stellt eine essenzielle Funktion unserer App dar, weshalb wir uns dessen Proof of Concept als unbedingt notwendig empfinden. Für den PoC haben wir eine grobe Recherche bezüglich Algorithmen für Empfehlungen durchgeführt (</a:t>
+              <a:t>Der Algorithmus für Empfehlungen stellt eine essenzielle Funktion unserer App dar, weshalb wir dessen Proof of Concept als unbedingt notwendig empfinden. Für den PoC haben wir eine grobe Recherche bezüglich Algorithmen für Empfehlungen durchgeführt (</a:t>
             </a:r>
             <a:r>
               <a:rPr lang="de-DE" sz="1400" dirty="0">
@@ -1204,7 +1204,7 @@
             <a:pPr marL="0" indent="0"/>
             <a:r>
               <a:rPr lang="de-DE" sz="1400" dirty="0"/>
-              <a:t>In der Recherche zu möglichen Datenbanken hat sich herausgestellt, dass es kaum Brettspieldatenbank gibt die auch eine Schnittstelle anbietet. Abgesehen von Boardgamegeek und APIs, die selber Boardgamegeek nutzen, konnten wir keine Alternative ausfindig machen. Daraus ergab sich das Problem, dass uns zunächst nicht ersichtlich war ob BGG überhaupt die Spiele in Genres einteilt. Die einzige Einteilung, die wir sehen konnten war nach Thematik und einzelnen Mechaniken der Spiele. Am Ende sind wir doch noch darauf gestoßen, wie BGG die Genres einteilt (Community Voting) und wo in den API-Daten wir das finden können.</a:t>
+              <a:t>In der Recherche zu möglichen Datenbanken hat sich herausgestellt, dass es kaum eine Brettspieldatenbank gibt die auch eine Schnittstelle anbietet. Abgesehen von Boardgamegeek und APIs, die selber Boardgamegeek nutzen, konnten wir keine Alternative ausfindig machen. Daraus ergab sich das Problem, dass uns zunächst nicht ersichtlich war ob BGG überhaupt die Spiele in Genres einteilt. Die einzige Einteilung, die wir sehen konnten war nach Thematik und einzelnen Mechaniken der Spiele. Am Ende sind wir doch noch darauf gestoßen, wie BGG die Genres einteilt (Community Voting) und wo in den API-Daten wir das finden können.</a:t>
             </a:r>
           </a:p>
           <a:p>
@@ -1488,7 +1488,7 @@
             <a:pPr marL="0" indent="0"/>
             <a:r>
               <a:rPr lang="de-DE" sz="1400" dirty="0"/>
-              <a:t>Frühe Spieleprototypen sind nicht auf BGG erfasst und somit wären diese für unser System verfügbar. Wir würden also Spieleentwickler darum bitten, nach dem BGG Schema ihre Prototypen einzuordnen. Diese Information muss dann von uns gespeichert werden, damit der </a:t>
+              <a:t>Frühe Spieleprototypen sind nicht auf BGG erfasst und somit wären diese für unser nicht System verfügbar. Wir würden also Spieleentwickler darum bitten, nach dem BGG Schema ihre Prototypen einzuordnen. Diese Information muss dann von uns gespeichert werden, damit der </a:t>
             </a:r>
             <a:r>
               <a:rPr lang="de-DE" sz="1400" dirty="0" err="1"/>
@@ -2948,7 +2948,7 @@
             </a:pPr>
             <a:fld id="{00000000-1234-1234-1234-123412341234}" type="slidenum">
               <a:rPr lang="en-US"/>
-              <a:t>‹Nr.›</a:t>
+              <a:t>‹#›</a:t>
             </a:fld>
             <a:endParaRPr/>
           </a:p>
@@ -3300,7 +3300,7 @@
             </a:pPr>
             <a:fld id="{00000000-1234-1234-1234-123412341234}" type="slidenum">
               <a:rPr lang="en-US"/>
-              <a:t>‹Nr.›</a:t>
+              <a:t>‹#›</a:t>
             </a:fld>
             <a:endParaRPr/>
           </a:p>
@@ -3961,7 +3961,7 @@
             </a:pPr>
             <a:fld id="{00000000-1234-1234-1234-123412341234}" type="slidenum">
               <a:rPr lang="en-US"/>
-              <a:t>‹Nr.›</a:t>
+              <a:t>‹#›</a:t>
             </a:fld>
             <a:endParaRPr/>
           </a:p>
@@ -4265,7 +4265,7 @@
             </a:pPr>
             <a:fld id="{00000000-1234-1234-1234-123412341234}" type="slidenum">
               <a:rPr lang="en-US"/>
-              <a:t>‹Nr.›</a:t>
+              <a:t>‹#›</a:t>
             </a:fld>
             <a:endParaRPr/>
           </a:p>
@@ -4948,7 +4948,7 @@
             </a:pPr>
             <a:fld id="{00000000-1234-1234-1234-123412341234}" type="slidenum">
               <a:rPr lang="en-US"/>
-              <a:t>‹Nr.›</a:t>
+              <a:t>‹#›</a:t>
             </a:fld>
             <a:endParaRPr sz="1600"/>
           </a:p>
@@ -5604,7 +5604,7 @@
             </a:pPr>
             <a:fld id="{00000000-1234-1234-1234-123412341234}" type="slidenum">
               <a:rPr lang="en-US"/>
-              <a:t>‹Nr.›</a:t>
+              <a:t>‹#›</a:t>
             </a:fld>
             <a:endParaRPr sz="1600"/>
           </a:p>
@@ -6263,7 +6263,7 @@
             </a:pPr>
             <a:fld id="{00000000-1234-1234-1234-123412341234}" type="slidenum">
               <a:rPr lang="en-US"/>
-              <a:t>‹Nr.›</a:t>
+              <a:t>‹#›</a:t>
             </a:fld>
             <a:endParaRPr/>
           </a:p>
@@ -6946,7 +6946,7 @@
             </a:pPr>
             <a:fld id="{00000000-1234-1234-1234-123412341234}" type="slidenum">
               <a:rPr lang="en-US"/>
-              <a:t>‹Nr.›</a:t>
+              <a:t>‹#›</a:t>
             </a:fld>
             <a:endParaRPr/>
           </a:p>
@@ -7413,7 +7413,7 @@
             </a:pPr>
             <a:fld id="{00000000-1234-1234-1234-123412341234}" type="slidenum">
               <a:rPr lang="en-US"/>
-              <a:t>‹Nr.›</a:t>
+              <a:t>‹#›</a:t>
             </a:fld>
             <a:endParaRPr/>
           </a:p>
@@ -8097,7 +8097,7 @@
             </a:pPr>
             <a:fld id="{00000000-1234-1234-1234-123412341234}" type="slidenum">
               <a:rPr lang="en-US"/>
-              <a:t>‹Nr.›</a:t>
+              <a:t>‹#›</a:t>
             </a:fld>
             <a:endParaRPr/>
           </a:p>
@@ -8564,7 +8564,7 @@
             </a:pPr>
             <a:fld id="{00000000-1234-1234-1234-123412341234}" type="slidenum">
               <a:rPr lang="en-US"/>
-              <a:t>‹Nr.›</a:t>
+              <a:t>‹#›</a:t>
             </a:fld>
             <a:endParaRPr/>
           </a:p>
@@ -9274,7 +9274,7 @@
             </a:pPr>
             <a:fld id="{00000000-1234-1234-1234-123412341234}" type="slidenum">
               <a:rPr lang="en-US"/>
-              <a:t>‹Nr.›</a:t>
+              <a:t>‹#›</a:t>
             </a:fld>
             <a:endParaRPr/>
           </a:p>
@@ -9957,7 +9957,7 @@
             </a:pPr>
             <a:fld id="{00000000-1234-1234-1234-123412341234}" type="slidenum">
               <a:rPr lang="en-US"/>
-              <a:t>‹Nr.›</a:t>
+              <a:t>‹#›</a:t>
             </a:fld>
             <a:endParaRPr/>
           </a:p>
@@ -10424,7 +10424,7 @@
             </a:pPr>
             <a:fld id="{00000000-1234-1234-1234-123412341234}" type="slidenum">
               <a:rPr lang="en-US"/>
-              <a:t>‹Nr.›</a:t>
+              <a:t>‹#›</a:t>
             </a:fld>
             <a:endParaRPr/>
           </a:p>
@@ -11275,7 +11275,7 @@
             </a:pPr>
             <a:fld id="{00000000-1234-1234-1234-123412341234}" type="slidenum">
               <a:rPr lang="en-US"/>
-              <a:t>‹Nr.›</a:t>
+              <a:t>‹#›</a:t>
             </a:fld>
             <a:endParaRPr sz="1400">
               <a:latin typeface="Arial"/>
@@ -29234,15 +29234,6 @@
 </file>
 
 <file path=customXml/item1.xml><?xml version="1.0" encoding="utf-8"?>
-<?mso-contentType ?>
-<FormTemplates xmlns="http://schemas.microsoft.com/sharepoint/v3/contenttype/forms">
-  <Display>DocumentLibraryForm</Display>
-  <Edit>DocumentLibraryForm</Edit>
-  <New>DocumentLibraryForm</New>
-</FormTemplates>
-</file>
-
-<file path=customXml/item2.xml><?xml version="1.0" encoding="utf-8"?>
 <ct:contentTypeSchema xmlns:ct="http://schemas.microsoft.com/office/2006/metadata/contentType" xmlns:ma="http://schemas.microsoft.com/office/2006/metadata/properties/metaAttributes" ct:_="" ma:_="" ma:contentTypeName="Dokument" ma:contentTypeID="0x010100CE6038D5A9A0634885E6554178F7F1A0" ma:contentTypeVersion="4" ma:contentTypeDescription="Ein neues Dokument erstellen." ma:contentTypeScope="" ma:versionID="c83d3dc0f92a4c87cf5bf9a6169962b2">
   <xsd:schema xmlns:xsd="http://www.w3.org/2001/XMLSchema" xmlns:xs="http://www.w3.org/2001/XMLSchema" xmlns:p="http://schemas.microsoft.com/office/2006/metadata/properties" xmlns:ns3="64cdd1e0-45e1-4db3-bc94-7e6cb21e298a" targetNamespace="http://schemas.microsoft.com/office/2006/metadata/properties" ma:root="true" ma:fieldsID="dedbc3502c77b788e6359a6d34fd83f5" ns3:_="">
     <xsd:import namespace="64cdd1e0-45e1-4db3-bc94-7e6cb21e298a"/>
@@ -29386,6 +29377,15 @@
 </ct:contentTypeSchema>
 </file>
 
+<file path=customXml/item2.xml><?xml version="1.0" encoding="utf-8"?>
+<?mso-contentType ?>
+<FormTemplates xmlns="http://schemas.microsoft.com/sharepoint/v3/contenttype/forms">
+  <Display>DocumentLibraryForm</Display>
+  <Edit>DocumentLibraryForm</Edit>
+  <New>DocumentLibraryForm</New>
+</FormTemplates>
+</file>
+
 <file path=customXml/item3.xml><?xml version="1.0" encoding="utf-8"?>
 <p:properties xmlns:p="http://schemas.microsoft.com/office/2006/metadata/properties" xmlns:xsi="http://www.w3.org/2001/XMLSchema-instance" xmlns:pc="http://schemas.microsoft.com/office/infopath/2007/PartnerControls">
   <documentManagement>
@@ -29395,14 +29395,6 @@
 </file>
 
 <file path=customXml/itemProps1.xml><?xml version="1.0" encoding="utf-8"?>
-<ds:datastoreItem xmlns:ds="http://schemas.openxmlformats.org/officeDocument/2006/customXml" ds:itemID="{8E3ACAEB-12A7-4E57-AD4B-3486E243683D}">
-  <ds:schemaRefs>
-    <ds:schemaRef ds:uri="http://schemas.microsoft.com/sharepoint/v3/contenttype/forms"/>
-  </ds:schemaRefs>
-</ds:datastoreItem>
-</file>
-
-<file path=customXml/itemProps2.xml><?xml version="1.0" encoding="utf-8"?>
 <ds:datastoreItem xmlns:ds="http://schemas.openxmlformats.org/officeDocument/2006/customXml" ds:itemID="{4755DCC8-0589-47AC-93D6-B6A700FA8E1F}">
   <ds:schemaRefs>
     <ds:schemaRef ds:uri="64cdd1e0-45e1-4db3-bc94-7e6cb21e298a"/>
@@ -29416,6 +29408,14 @@
     <ds:schemaRef ds:uri="http://schemas.microsoft.com/office/infopath/2007/PartnerControls"/>
     <ds:schemaRef ds:uri="http://schemas.openxmlformats.org/package/2006/metadata/core-properties"/>
     <ds:schemaRef ds:uri="http://www.w3.org/2001/XMLSchema"/>
+  </ds:schemaRefs>
+</ds:datastoreItem>
+</file>
+
+<file path=customXml/itemProps2.xml><?xml version="1.0" encoding="utf-8"?>
+<ds:datastoreItem xmlns:ds="http://schemas.openxmlformats.org/officeDocument/2006/customXml" ds:itemID="{8E3ACAEB-12A7-4E57-AD4B-3486E243683D}">
+  <ds:schemaRefs>
+    <ds:schemaRef ds:uri="http://schemas.microsoft.com/sharepoint/v3/contenttype/forms"/>
   </ds:schemaRefs>
 </ds:datastoreItem>
 </file>

</xml_diff>